<commit_message>
update ppt and upload all images
</commit_message>
<xml_diff>
--- a/PS1/Yunqing_Jia.pptx
+++ b/PS1/Yunqing_Jia.pptx
@@ -14693,6 +14693,36 @@
           </a:prstGeom>
         </p:spPr>
       </p:pic>
+      <p:pic>
+        <p:nvPicPr>
+          <p:cNvPr id="4" name="Picture 3" descr="A picture containing chart&#10;&#10;Description automatically generated">
+            <a:extLst>
+              <a:ext uri="{FF2B5EF4-FFF2-40B4-BE49-F238E27FC236}">
+                <a16:creationId xmlns:a16="http://schemas.microsoft.com/office/drawing/2014/main" id="{9C09ECAA-9A17-4032-AC56-EB8DCB444D15}"/>
+              </a:ext>
+            </a:extLst>
+          </p:cNvPr>
+          <p:cNvPicPr>
+            <a:picLocks noChangeAspect="1"/>
+          </p:cNvPicPr>
+          <p:nvPr/>
+        </p:nvPicPr>
+        <p:blipFill>
+          <a:blip r:embed="rId4"/>
+          <a:stretch>
+            <a:fillRect/>
+          </a:stretch>
+        </p:blipFill>
+        <p:spPr>
+          <a:xfrm>
+            <a:off x="4311600" y="971550"/>
+            <a:ext cx="4267200" cy="3200400"/>
+          </a:xfrm>
+          <a:prstGeom prst="rect">
+            <a:avLst/>
+          </a:prstGeom>
+        </p:spPr>
+      </p:pic>
     </p:spTree>
   </p:cSld>
   <p:clrMapOvr>

</xml_diff>